<commit_message>
Update diplom for Adel
</commit_message>
<xml_diff>
--- a/2023/Диплом/Адель/Презентация Адель.pptx
+++ b/2023/Диплом/Адель/Презентация Адель.pptx
@@ -394,7 +394,7 @@
           <a:p>
             <a:fld id="{8720104C-3C9D-4B62-9936-5C987D21D7C9}" type="datetimeFigureOut">
               <a:rPr lang="ru-RU" smtClean="0"/>
-              <a:t>14.05.2023</a:t>
+              <a:t>19.05.2023</a:t>
             </a:fld>
             <a:endParaRPr lang="ru-RU"/>
           </a:p>
@@ -808,7 +808,7 @@
           <a:p>
             <a:fld id="{8720104C-3C9D-4B62-9936-5C987D21D7C9}" type="datetimeFigureOut">
               <a:rPr lang="ru-RU" smtClean="0"/>
-              <a:t>14.05.2023</a:t>
+              <a:t>19.05.2023</a:t>
             </a:fld>
             <a:endParaRPr lang="ru-RU"/>
           </a:p>
@@ -1144,7 +1144,7 @@
           <a:p>
             <a:fld id="{8720104C-3C9D-4B62-9936-5C987D21D7C9}" type="datetimeFigureOut">
               <a:rPr lang="ru-RU" smtClean="0"/>
-              <a:t>14.05.2023</a:t>
+              <a:t>19.05.2023</a:t>
             </a:fld>
             <a:endParaRPr lang="ru-RU"/>
           </a:p>
@@ -1549,7 +1549,7 @@
           <a:p>
             <a:fld id="{8720104C-3C9D-4B62-9936-5C987D21D7C9}" type="datetimeFigureOut">
               <a:rPr lang="ru-RU" smtClean="0"/>
-              <a:t>14.05.2023</a:t>
+              <a:t>19.05.2023</a:t>
             </a:fld>
             <a:endParaRPr lang="ru-RU"/>
           </a:p>
@@ -2117,7 +2117,7 @@
           <a:p>
             <a:fld id="{8720104C-3C9D-4B62-9936-5C987D21D7C9}" type="datetimeFigureOut">
               <a:rPr lang="ru-RU" smtClean="0"/>
-              <a:t>14.05.2023</a:t>
+              <a:t>19.05.2023</a:t>
             </a:fld>
             <a:endParaRPr lang="ru-RU"/>
           </a:p>
@@ -2798,7 +2798,7 @@
           <a:p>
             <a:fld id="{8720104C-3C9D-4B62-9936-5C987D21D7C9}" type="datetimeFigureOut">
               <a:rPr lang="ru-RU" smtClean="0"/>
-              <a:t>14.05.2023</a:t>
+              <a:t>19.05.2023</a:t>
             </a:fld>
             <a:endParaRPr lang="ru-RU"/>
           </a:p>
@@ -3711,7 +3711,7 @@
           <a:p>
             <a:fld id="{8720104C-3C9D-4B62-9936-5C987D21D7C9}" type="datetimeFigureOut">
               <a:rPr lang="ru-RU" smtClean="0"/>
-              <a:t>14.05.2023</a:t>
+              <a:t>19.05.2023</a:t>
             </a:fld>
             <a:endParaRPr lang="ru-RU"/>
           </a:p>
@@ -4024,7 +4024,7 @@
           <a:p>
             <a:fld id="{8720104C-3C9D-4B62-9936-5C987D21D7C9}" type="datetimeFigureOut">
               <a:rPr lang="ru-RU" smtClean="0"/>
-              <a:t>14.05.2023</a:t>
+              <a:t>19.05.2023</a:t>
             </a:fld>
             <a:endParaRPr lang="ru-RU"/>
           </a:p>
@@ -4288,7 +4288,7 @@
           <a:p>
             <a:fld id="{8720104C-3C9D-4B62-9936-5C987D21D7C9}" type="datetimeFigureOut">
               <a:rPr lang="ru-RU" smtClean="0"/>
-              <a:t>14.05.2023</a:t>
+              <a:t>19.05.2023</a:t>
             </a:fld>
             <a:endParaRPr lang="ru-RU"/>
           </a:p>
@@ -4611,7 +4611,7 @@
           <a:p>
             <a:fld id="{8720104C-3C9D-4B62-9936-5C987D21D7C9}" type="datetimeFigureOut">
               <a:rPr lang="ru-RU" smtClean="0"/>
-              <a:t>14.05.2023</a:t>
+              <a:t>19.05.2023</a:t>
             </a:fld>
             <a:endParaRPr lang="ru-RU"/>
           </a:p>
@@ -5000,7 +5000,7 @@
           <a:p>
             <a:fld id="{8720104C-3C9D-4B62-9936-5C987D21D7C9}" type="datetimeFigureOut">
               <a:rPr lang="ru-RU" smtClean="0"/>
-              <a:t>14.05.2023</a:t>
+              <a:t>19.05.2023</a:t>
             </a:fld>
             <a:endParaRPr lang="ru-RU"/>
           </a:p>
@@ -5376,7 +5376,7 @@
           <a:p>
             <a:fld id="{8720104C-3C9D-4B62-9936-5C987D21D7C9}" type="datetimeFigureOut">
               <a:rPr lang="ru-RU" smtClean="0"/>
-              <a:t>14.05.2023</a:t>
+              <a:t>19.05.2023</a:t>
             </a:fld>
             <a:endParaRPr lang="ru-RU"/>
           </a:p>
@@ -5882,7 +5882,7 @@
           <a:p>
             <a:fld id="{8720104C-3C9D-4B62-9936-5C987D21D7C9}" type="datetimeFigureOut">
               <a:rPr lang="ru-RU" smtClean="0"/>
-              <a:t>14.05.2023</a:t>
+              <a:t>19.05.2023</a:t>
             </a:fld>
             <a:endParaRPr lang="ru-RU"/>
           </a:p>
@@ -6139,7 +6139,7 @@
           <a:p>
             <a:fld id="{8720104C-3C9D-4B62-9936-5C987D21D7C9}" type="datetimeFigureOut">
               <a:rPr lang="ru-RU" smtClean="0"/>
-              <a:t>14.05.2023</a:t>
+              <a:t>19.05.2023</a:t>
             </a:fld>
             <a:endParaRPr lang="ru-RU"/>
           </a:p>
@@ -6302,7 +6302,7 @@
           <a:p>
             <a:fld id="{8720104C-3C9D-4B62-9936-5C987D21D7C9}" type="datetimeFigureOut">
               <a:rPr lang="ru-RU" smtClean="0"/>
-              <a:t>14.05.2023</a:t>
+              <a:t>19.05.2023</a:t>
             </a:fld>
             <a:endParaRPr lang="ru-RU"/>
           </a:p>
@@ -6692,7 +6692,7 @@
           <a:p>
             <a:fld id="{8720104C-3C9D-4B62-9936-5C987D21D7C9}" type="datetimeFigureOut">
               <a:rPr lang="ru-RU" smtClean="0"/>
-              <a:t>14.05.2023</a:t>
+              <a:t>19.05.2023</a:t>
             </a:fld>
             <a:endParaRPr lang="ru-RU"/>
           </a:p>
@@ -7101,7 +7101,7 @@
           <a:p>
             <a:fld id="{8720104C-3C9D-4B62-9936-5C987D21D7C9}" type="datetimeFigureOut">
               <a:rPr lang="ru-RU" smtClean="0"/>
-              <a:t>14.05.2023</a:t>
+              <a:t>19.05.2023</a:t>
             </a:fld>
             <a:endParaRPr lang="ru-RU"/>
           </a:p>
@@ -7345,7 +7345,7 @@
           <a:p>
             <a:fld id="{8720104C-3C9D-4B62-9936-5C987D21D7C9}" type="datetimeFigureOut">
               <a:rPr lang="ru-RU" smtClean="0"/>
-              <a:t>14.05.2023</a:t>
+              <a:t>19.05.2023</a:t>
             </a:fld>
             <a:endParaRPr lang="ru-RU"/>
           </a:p>
@@ -7768,8 +7768,8 @@
         </p:nvSpPr>
         <p:spPr>
           <a:xfrm>
-            <a:off x="221673" y="665019"/>
-            <a:ext cx="11277600" cy="3385818"/>
+            <a:off x="193964" y="872837"/>
+            <a:ext cx="11277600" cy="3441236"/>
           </a:xfrm>
         </p:spPr>
         <p:txBody>
@@ -7797,55 +7797,44 @@
               </a:rPr>
             </a:br>
             <a:r>
-              <a:rPr lang="ru-RU" sz="5400" dirty="0">
-                <a:solidFill>
-                  <a:schemeClr val="tx1"/>
-                </a:solidFill>
+              <a:rPr lang="ru-RU" dirty="0" smtClean="0">
                 <a:latin typeface="Times New Roman" panose="02020603050405020304" pitchFamily="18" charset="0"/>
                 <a:cs typeface="Times New Roman" panose="02020603050405020304" pitchFamily="18" charset="0"/>
               </a:rPr>
               <a:t>а</a:t>
             </a:r>
             <a:r>
-              <a:rPr lang="ru-RU" sz="5400" dirty="0" smtClean="0">
-                <a:solidFill>
-                  <a:schemeClr val="tx1"/>
-                </a:solidFill>
+              <a:rPr lang="ru-RU" dirty="0" smtClean="0">
                 <a:latin typeface="Times New Roman" panose="02020603050405020304" pitchFamily="18" charset="0"/>
                 <a:cs typeface="Times New Roman" panose="02020603050405020304" pitchFamily="18" charset="0"/>
               </a:rPr>
               <a:t>втоматизация </a:t>
             </a:r>
             <a:r>
-              <a:rPr lang="ru-RU" sz="5400" dirty="0">
-                <a:solidFill>
-                  <a:schemeClr val="tx1"/>
-                </a:solidFill>
+              <a:rPr lang="ru-RU" dirty="0">
                 <a:latin typeface="Times New Roman" panose="02020603050405020304" pitchFamily="18" charset="0"/>
                 <a:cs typeface="Times New Roman" panose="02020603050405020304" pitchFamily="18" charset="0"/>
               </a:rPr>
-              <a:t>технологического узла получения пропилена из </a:t>
-            </a:r>
-            <a:r>
-              <a:rPr lang="ru-RU" sz="5400" dirty="0" smtClean="0">
-                <a:solidFill>
-                  <a:schemeClr val="tx1"/>
-                </a:solidFill>
+              <a:t>технологического </a:t>
+            </a:r>
+            <a:r>
+              <a:rPr lang="ru-RU" dirty="0" smtClean="0">
                 <a:latin typeface="Times New Roman" panose="02020603050405020304" pitchFamily="18" charset="0"/>
                 <a:cs typeface="Times New Roman" panose="02020603050405020304" pitchFamily="18" charset="0"/>
               </a:rPr>
-              <a:t>пропан-пропиленовой </a:t>
-            </a:r>
-            <a:r>
-              <a:rPr lang="ru-RU" sz="5400" dirty="0">
-                <a:solidFill>
-                  <a:schemeClr val="tx1"/>
-                </a:solidFill>
+              <a:t>узла ректификации пропан-пропиленовой фракции </a:t>
+            </a:r>
+            <a:r>
+              <a:rPr lang="ru-RU" dirty="0">
                 <a:latin typeface="Times New Roman" panose="02020603050405020304" pitchFamily="18" charset="0"/>
                 <a:cs typeface="Times New Roman" panose="02020603050405020304" pitchFamily="18" charset="0"/>
               </a:rPr>
-              <a:t>фракции</a:t>
-            </a:r>
+              <a:t>в колонне К-308</a:t>
+            </a:r>
+            <a:endParaRPr lang="ru-RU" dirty="0">
+              <a:latin typeface="Times New Roman" panose="02020603050405020304" pitchFamily="18" charset="0"/>
+              <a:cs typeface="Times New Roman" panose="02020603050405020304" pitchFamily="18" charset="0"/>
+            </a:endParaRPr>
           </a:p>
         </p:txBody>
       </p:sp>
@@ -7879,27 +7868,7 @@
                 <a:latin typeface="Times New Roman" panose="02020603050405020304" pitchFamily="18" charset="0"/>
                 <a:cs typeface="Times New Roman" panose="02020603050405020304" pitchFamily="18" charset="0"/>
               </a:rPr>
-              <a:t>Выполнил: </a:t>
-            </a:r>
-            <a:r>
-              <a:rPr lang="ru-RU" sz="2400" dirty="0" smtClean="0">
-                <a:solidFill>
-                  <a:schemeClr val="tx1"/>
-                </a:solidFill>
-                <a:latin typeface="Times New Roman" panose="02020603050405020304" pitchFamily="18" charset="0"/>
-                <a:cs typeface="Times New Roman" panose="02020603050405020304" pitchFamily="18" charset="0"/>
-              </a:rPr>
-              <a:t>Мустафин </a:t>
-            </a:r>
-            <a:r>
-              <a:rPr lang="ru-RU" sz="2400" dirty="0" smtClean="0">
-                <a:solidFill>
-                  <a:schemeClr val="tx1"/>
-                </a:solidFill>
-                <a:latin typeface="Times New Roman" panose="02020603050405020304" pitchFamily="18" charset="0"/>
-                <a:cs typeface="Times New Roman" panose="02020603050405020304" pitchFamily="18" charset="0"/>
-              </a:rPr>
-              <a:t>А. А.</a:t>
+              <a:t>Выполнил: Мустафин А. А.</a:t>
             </a:r>
           </a:p>
           <a:p>
@@ -8211,7 +8180,7 @@
         </p:nvSpPr>
         <p:spPr>
           <a:xfrm>
-            <a:off x="0" y="803564"/>
+            <a:off x="-1" y="639558"/>
             <a:ext cx="12191999" cy="1320800"/>
           </a:xfrm>
         </p:spPr>

</xml_diff>

<commit_message>
Update  schemes for Adel, Vadim, Nursil
</commit_message>
<xml_diff>
--- a/2023/Диплом/Адель/Презентация Адель.pptx
+++ b/2023/Диплом/Адель/Презентация Адель.pptx
@@ -394,7 +394,7 @@
           <a:p>
             <a:fld id="{8720104C-3C9D-4B62-9936-5C987D21D7C9}" type="datetimeFigureOut">
               <a:rPr lang="ru-RU" smtClean="0"/>
-              <a:t>19.05.2023</a:t>
+              <a:t>22.05.2023</a:t>
             </a:fld>
             <a:endParaRPr lang="ru-RU"/>
           </a:p>
@@ -808,7 +808,7 @@
           <a:p>
             <a:fld id="{8720104C-3C9D-4B62-9936-5C987D21D7C9}" type="datetimeFigureOut">
               <a:rPr lang="ru-RU" smtClean="0"/>
-              <a:t>19.05.2023</a:t>
+              <a:t>22.05.2023</a:t>
             </a:fld>
             <a:endParaRPr lang="ru-RU"/>
           </a:p>
@@ -1144,7 +1144,7 @@
           <a:p>
             <a:fld id="{8720104C-3C9D-4B62-9936-5C987D21D7C9}" type="datetimeFigureOut">
               <a:rPr lang="ru-RU" smtClean="0"/>
-              <a:t>19.05.2023</a:t>
+              <a:t>22.05.2023</a:t>
             </a:fld>
             <a:endParaRPr lang="ru-RU"/>
           </a:p>
@@ -1549,7 +1549,7 @@
           <a:p>
             <a:fld id="{8720104C-3C9D-4B62-9936-5C987D21D7C9}" type="datetimeFigureOut">
               <a:rPr lang="ru-RU" smtClean="0"/>
-              <a:t>19.05.2023</a:t>
+              <a:t>22.05.2023</a:t>
             </a:fld>
             <a:endParaRPr lang="ru-RU"/>
           </a:p>
@@ -2117,7 +2117,7 @@
           <a:p>
             <a:fld id="{8720104C-3C9D-4B62-9936-5C987D21D7C9}" type="datetimeFigureOut">
               <a:rPr lang="ru-RU" smtClean="0"/>
-              <a:t>19.05.2023</a:t>
+              <a:t>22.05.2023</a:t>
             </a:fld>
             <a:endParaRPr lang="ru-RU"/>
           </a:p>
@@ -2798,7 +2798,7 @@
           <a:p>
             <a:fld id="{8720104C-3C9D-4B62-9936-5C987D21D7C9}" type="datetimeFigureOut">
               <a:rPr lang="ru-RU" smtClean="0"/>
-              <a:t>19.05.2023</a:t>
+              <a:t>22.05.2023</a:t>
             </a:fld>
             <a:endParaRPr lang="ru-RU"/>
           </a:p>
@@ -3711,7 +3711,7 @@
           <a:p>
             <a:fld id="{8720104C-3C9D-4B62-9936-5C987D21D7C9}" type="datetimeFigureOut">
               <a:rPr lang="ru-RU" smtClean="0"/>
-              <a:t>19.05.2023</a:t>
+              <a:t>22.05.2023</a:t>
             </a:fld>
             <a:endParaRPr lang="ru-RU"/>
           </a:p>
@@ -4024,7 +4024,7 @@
           <a:p>
             <a:fld id="{8720104C-3C9D-4B62-9936-5C987D21D7C9}" type="datetimeFigureOut">
               <a:rPr lang="ru-RU" smtClean="0"/>
-              <a:t>19.05.2023</a:t>
+              <a:t>22.05.2023</a:t>
             </a:fld>
             <a:endParaRPr lang="ru-RU"/>
           </a:p>
@@ -4288,7 +4288,7 @@
           <a:p>
             <a:fld id="{8720104C-3C9D-4B62-9936-5C987D21D7C9}" type="datetimeFigureOut">
               <a:rPr lang="ru-RU" smtClean="0"/>
-              <a:t>19.05.2023</a:t>
+              <a:t>22.05.2023</a:t>
             </a:fld>
             <a:endParaRPr lang="ru-RU"/>
           </a:p>
@@ -4611,7 +4611,7 @@
           <a:p>
             <a:fld id="{8720104C-3C9D-4B62-9936-5C987D21D7C9}" type="datetimeFigureOut">
               <a:rPr lang="ru-RU" smtClean="0"/>
-              <a:t>19.05.2023</a:t>
+              <a:t>22.05.2023</a:t>
             </a:fld>
             <a:endParaRPr lang="ru-RU"/>
           </a:p>
@@ -5000,7 +5000,7 @@
           <a:p>
             <a:fld id="{8720104C-3C9D-4B62-9936-5C987D21D7C9}" type="datetimeFigureOut">
               <a:rPr lang="ru-RU" smtClean="0"/>
-              <a:t>19.05.2023</a:t>
+              <a:t>22.05.2023</a:t>
             </a:fld>
             <a:endParaRPr lang="ru-RU"/>
           </a:p>
@@ -5376,7 +5376,7 @@
           <a:p>
             <a:fld id="{8720104C-3C9D-4B62-9936-5C987D21D7C9}" type="datetimeFigureOut">
               <a:rPr lang="ru-RU" smtClean="0"/>
-              <a:t>19.05.2023</a:t>
+              <a:t>22.05.2023</a:t>
             </a:fld>
             <a:endParaRPr lang="ru-RU"/>
           </a:p>
@@ -5882,7 +5882,7 @@
           <a:p>
             <a:fld id="{8720104C-3C9D-4B62-9936-5C987D21D7C9}" type="datetimeFigureOut">
               <a:rPr lang="ru-RU" smtClean="0"/>
-              <a:t>19.05.2023</a:t>
+              <a:t>22.05.2023</a:t>
             </a:fld>
             <a:endParaRPr lang="ru-RU"/>
           </a:p>
@@ -6139,7 +6139,7 @@
           <a:p>
             <a:fld id="{8720104C-3C9D-4B62-9936-5C987D21D7C9}" type="datetimeFigureOut">
               <a:rPr lang="ru-RU" smtClean="0"/>
-              <a:t>19.05.2023</a:t>
+              <a:t>22.05.2023</a:t>
             </a:fld>
             <a:endParaRPr lang="ru-RU"/>
           </a:p>
@@ -6302,7 +6302,7 @@
           <a:p>
             <a:fld id="{8720104C-3C9D-4B62-9936-5C987D21D7C9}" type="datetimeFigureOut">
               <a:rPr lang="ru-RU" smtClean="0"/>
-              <a:t>19.05.2023</a:t>
+              <a:t>22.05.2023</a:t>
             </a:fld>
             <a:endParaRPr lang="ru-RU"/>
           </a:p>
@@ -6692,7 +6692,7 @@
           <a:p>
             <a:fld id="{8720104C-3C9D-4B62-9936-5C987D21D7C9}" type="datetimeFigureOut">
               <a:rPr lang="ru-RU" smtClean="0"/>
-              <a:t>19.05.2023</a:t>
+              <a:t>22.05.2023</a:t>
             </a:fld>
             <a:endParaRPr lang="ru-RU"/>
           </a:p>
@@ -7101,7 +7101,7 @@
           <a:p>
             <a:fld id="{8720104C-3C9D-4B62-9936-5C987D21D7C9}" type="datetimeFigureOut">
               <a:rPr lang="ru-RU" smtClean="0"/>
-              <a:t>19.05.2023</a:t>
+              <a:t>22.05.2023</a:t>
             </a:fld>
             <a:endParaRPr lang="ru-RU"/>
           </a:p>
@@ -7345,7 +7345,7 @@
           <a:p>
             <a:fld id="{8720104C-3C9D-4B62-9936-5C987D21D7C9}" type="datetimeFigureOut">
               <a:rPr lang="ru-RU" smtClean="0"/>
-              <a:t>19.05.2023</a:t>
+              <a:t>22.05.2023</a:t>
             </a:fld>
             <a:endParaRPr lang="ru-RU"/>
           </a:p>
@@ -7801,14 +7801,7 @@
                 <a:latin typeface="Times New Roman" panose="02020603050405020304" pitchFamily="18" charset="0"/>
                 <a:cs typeface="Times New Roman" panose="02020603050405020304" pitchFamily="18" charset="0"/>
               </a:rPr>
-              <a:t>а</a:t>
-            </a:r>
-            <a:r>
-              <a:rPr lang="ru-RU" dirty="0" smtClean="0">
-                <a:latin typeface="Times New Roman" panose="02020603050405020304" pitchFamily="18" charset="0"/>
-                <a:cs typeface="Times New Roman" panose="02020603050405020304" pitchFamily="18" charset="0"/>
-              </a:rPr>
-              <a:t>втоматизация </a:t>
+              <a:t>автоматизация </a:t>
             </a:r>
             <a:r>
               <a:rPr lang="ru-RU" dirty="0">
@@ -7831,10 +7824,6 @@
               </a:rPr>
               <a:t>в колонне К-308</a:t>
             </a:r>
-            <a:endParaRPr lang="ru-RU" dirty="0">
-              <a:latin typeface="Times New Roman" panose="02020603050405020304" pitchFamily="18" charset="0"/>
-              <a:cs typeface="Times New Roman" panose="02020603050405020304" pitchFamily="18" charset="0"/>
-            </a:endParaRPr>
           </a:p>
         </p:txBody>
       </p:sp>
@@ -8332,7 +8321,7 @@
       </p:sp>
       <p:pic>
         <p:nvPicPr>
-          <p:cNvPr id="4" name="Picture 2" descr="https://lh3.googleusercontent.com/n44YdKcOlniBxZgZ0VQl6UqJQJUksPIGh3Wgfj2kHQ-tJ8N9HI2TvsRZmQQmyDyxseENEHYWABvrZwpjNWh_TpdFyfVoA-3hbG0GkgUJhw"/>
+          <p:cNvPr id="2050" name="Picture 2" descr="https://lh3.googleusercontent.com/PFWxbl16uVCdf-GHJMtjfYNBqhQ4Ci-vMN3kc6_XrWEotaukPtg-wOmvCmEVUAlvFmTYHm7MY01eGkIu_f72FKsdxXsxwPZPyDXXXRX4"/>
           <p:cNvPicPr>
             <a:picLocks noChangeAspect="1" noChangeArrowheads="1"/>
           </p:cNvPicPr>
@@ -8353,8 +8342,8 @@
         </p:blipFill>
         <p:spPr bwMode="auto">
           <a:xfrm>
-            <a:off x="6483927" y="387928"/>
-            <a:ext cx="5577315" cy="5824971"/>
+            <a:off x="5902036" y="1686613"/>
+            <a:ext cx="6165273" cy="4357609"/>
           </a:xfrm>
           <a:prstGeom prst="rect">
             <a:avLst/>
@@ -8544,13 +8533,11 @@
       </p:sp>
       <p:pic>
         <p:nvPicPr>
-          <p:cNvPr id="4" name="Picture 2" descr="https://lh3.googleusercontent.com/kX3RBxByLPVRl11PLmQRx_7-QACiFK7OOpH5C8beoayBWuHuvfpHEg3D9dQfotrsnEIlCKE7s9e9qYfA9P5YAEJZoyS_n7KY7VB2UTjxCw"/>
+          <p:cNvPr id="5" name="Picture 4" descr="Шкаф управления Wilo SK"/>
           <p:cNvPicPr>
-            <a:picLocks noGrp="1" noChangeAspect="1" noChangeArrowheads="1"/>
+            <a:picLocks noChangeAspect="1" noChangeArrowheads="1"/>
           </p:cNvPicPr>
-          <p:nvPr>
-            <p:ph idx="1"/>
-          </p:nvPr>
+          <p:nvPr/>
         </p:nvPicPr>
         <p:blipFill>
           <a:blip r:embed="rId2">
@@ -8567,8 +8554,8 @@
         </p:blipFill>
         <p:spPr bwMode="auto">
           <a:xfrm>
-            <a:off x="7177151" y="133927"/>
-            <a:ext cx="4627830" cy="6599382"/>
+            <a:off x="474229" y="2182091"/>
+            <a:ext cx="5850647" cy="3415145"/>
           </a:xfrm>
           <a:prstGeom prst="rect">
             <a:avLst/>
@@ -8587,7 +8574,7 @@
       </p:pic>
       <p:pic>
         <p:nvPicPr>
-          <p:cNvPr id="5" name="Picture 4" descr="Шкаф управления Wilo SK"/>
+          <p:cNvPr id="1026" name="Picture 2" descr="https://lh3.googleusercontent.com/Geafa_bEMi5qcSkneB191NYrKRGPV_MBxKHCX2Q20SZBrf1dv7J6JVNBO3RSIeDFQRJ48rNKLXvNU6w86UsfpOHP7jaOLEQusehOZUg"/>
           <p:cNvPicPr>
             <a:picLocks noChangeAspect="1" noChangeArrowheads="1"/>
           </p:cNvPicPr>
@@ -8608,8 +8595,8 @@
         </p:blipFill>
         <p:spPr bwMode="auto">
           <a:xfrm>
-            <a:off x="474229" y="2182091"/>
-            <a:ext cx="5850647" cy="3415145"/>
+            <a:off x="7273637" y="665018"/>
+            <a:ext cx="4068041" cy="5785205"/>
           </a:xfrm>
           <a:prstGeom prst="rect">
             <a:avLst/>

</xml_diff>